<commit_message>
airports cstate and country
</commit_message>
<xml_diff>
--- a/16_Project_5_Capstone_Project/capstone_project.pptx
+++ b/16_Project_5_Capstone_Project/capstone_project.pptx
@@ -4561,13 +4561,13 @@
           <p:nvPr>
             <p:extLst>
               <p:ext uri="{D42A27DB-BD31-4B8C-83A1-F6EECF244321}">
-                <p14:modId xmlns:p14="http://schemas.microsoft.com/office/powerpoint/2010/main" val="3180872041"/>
+                <p14:modId xmlns:p14="http://schemas.microsoft.com/office/powerpoint/2010/main" val="3928192332"/>
               </p:ext>
             </p:extLst>
           </p:nvPr>
         </p:nvGraphicFramePr>
         <p:xfrm>
-          <a:off x="9260549" y="5229225"/>
+          <a:off x="9122555" y="4369572"/>
           <a:ext cx="2669546" cy="4754880"/>
         </p:xfrm>
         <a:graphic>

</xml_diff>